<commit_message>
slides kayak et relecture code
</commit_message>
<xml_diff>
--- a/03_data_collection/99_Project_Kayak/assets/heap/kayak.pptx
+++ b/03_data_collection/99_Project_Kayak/assets/heap/kayak.pptx
@@ -114,16 +114,24 @@
 </p:presentation>
 </file>
 
-<file path=ppt/revisionInfo.xml><?xml version="1.0" encoding="utf-8"?>
-<p1510:revInfo xmlns:a="http://schemas.openxmlformats.org/drawingml/2006/main" xmlns:r="http://schemas.openxmlformats.org/officeDocument/2006/relationships" xmlns:p1510="http://schemas.microsoft.com/office/powerpoint/2015/10/main">
-  <p1510:revLst>
-    <p1510:client id="{F0A5AED7-C8BC-4CA0-9EC5-CEEAB7556C42}" v="17" dt="2024-04-11T21:37:48.838"/>
-  </p1510:revLst>
-</p1510:revInfo>
-</file>
-
 <file path=ppt/changesInfos/changesInfo1.xml><?xml version="1.0" encoding="utf-8"?>
 <pc:chgInfo xmlns:a="http://schemas.openxmlformats.org/drawingml/2006/main" xmlns:r="http://schemas.openxmlformats.org/officeDocument/2006/relationships" xmlns:ac="http://schemas.microsoft.com/office/drawing/2013/main/command" xmlns:pc="http://schemas.microsoft.com/office/powerpoint/2013/main/command">
+  <pc:docChgLst>
+    <pc:chgData name="Philippe Baucour" userId="5102170ae7533958" providerId="LiveId" clId="{6748DEAB-5794-4B60-ADB9-899E00F2A034}"/>
+    <pc:docChg chg="modSld">
+      <pc:chgData name="Philippe Baucour" userId="5102170ae7533958" providerId="LiveId" clId="{6748DEAB-5794-4B60-ADB9-899E00F2A034}" dt="2024-08-20T08:45:56.268" v="0" actId="729"/>
+      <pc:docMkLst>
+        <pc:docMk/>
+      </pc:docMkLst>
+      <pc:sldChg chg="mod modShow">
+        <pc:chgData name="Philippe Baucour" userId="5102170ae7533958" providerId="LiveId" clId="{6748DEAB-5794-4B60-ADB9-899E00F2A034}" dt="2024-08-20T08:45:56.268" v="0" actId="729"/>
+        <pc:sldMkLst>
+          <pc:docMk/>
+          <pc:sldMk cId="2169634315" sldId="257"/>
+        </pc:sldMkLst>
+      </pc:sldChg>
+    </pc:docChg>
+  </pc:docChgLst>
   <pc:docChgLst>
     <pc:chgData name="Philippe Baucour" userId="5102170ae7533958" providerId="LiveId" clId="{F0A5AED7-C8BC-4CA0-9EC5-CEEAB7556C42}"/>
     <pc:docChg chg="undo custSel addSld modSld">
@@ -800,7 +808,7 @@
           <a:p>
             <a:fld id="{1629B0A5-A2FC-4930-8605-694DD097931F}" type="datetimeFigureOut">
               <a:rPr lang="fr-FR" smtClean="0"/>
-              <a:t>11/04/2024</a:t>
+              <a:t>20/08/2024</a:t>
             </a:fld>
             <a:endParaRPr lang="fr-FR"/>
           </a:p>
@@ -998,7 +1006,7 @@
           <a:p>
             <a:fld id="{1629B0A5-A2FC-4930-8605-694DD097931F}" type="datetimeFigureOut">
               <a:rPr lang="fr-FR" smtClean="0"/>
-              <a:t>11/04/2024</a:t>
+              <a:t>20/08/2024</a:t>
             </a:fld>
             <a:endParaRPr lang="fr-FR"/>
           </a:p>
@@ -1206,7 +1214,7 @@
           <a:p>
             <a:fld id="{1629B0A5-A2FC-4930-8605-694DD097931F}" type="datetimeFigureOut">
               <a:rPr lang="fr-FR" smtClean="0"/>
-              <a:t>11/04/2024</a:t>
+              <a:t>20/08/2024</a:t>
             </a:fld>
             <a:endParaRPr lang="fr-FR"/>
           </a:p>
@@ -1404,7 +1412,7 @@
           <a:p>
             <a:fld id="{1629B0A5-A2FC-4930-8605-694DD097931F}" type="datetimeFigureOut">
               <a:rPr lang="fr-FR" smtClean="0"/>
-              <a:t>11/04/2024</a:t>
+              <a:t>20/08/2024</a:t>
             </a:fld>
             <a:endParaRPr lang="fr-FR"/>
           </a:p>
@@ -1679,7 +1687,7 @@
           <a:p>
             <a:fld id="{1629B0A5-A2FC-4930-8605-694DD097931F}" type="datetimeFigureOut">
               <a:rPr lang="fr-FR" smtClean="0"/>
-              <a:t>11/04/2024</a:t>
+              <a:t>20/08/2024</a:t>
             </a:fld>
             <a:endParaRPr lang="fr-FR"/>
           </a:p>
@@ -1944,7 +1952,7 @@
           <a:p>
             <a:fld id="{1629B0A5-A2FC-4930-8605-694DD097931F}" type="datetimeFigureOut">
               <a:rPr lang="fr-FR" smtClean="0"/>
-              <a:t>11/04/2024</a:t>
+              <a:t>20/08/2024</a:t>
             </a:fld>
             <a:endParaRPr lang="fr-FR"/>
           </a:p>
@@ -2356,7 +2364,7 @@
           <a:p>
             <a:fld id="{1629B0A5-A2FC-4930-8605-694DD097931F}" type="datetimeFigureOut">
               <a:rPr lang="fr-FR" smtClean="0"/>
-              <a:t>11/04/2024</a:t>
+              <a:t>20/08/2024</a:t>
             </a:fld>
             <a:endParaRPr lang="fr-FR"/>
           </a:p>
@@ -2497,7 +2505,7 @@
           <a:p>
             <a:fld id="{1629B0A5-A2FC-4930-8605-694DD097931F}" type="datetimeFigureOut">
               <a:rPr lang="fr-FR" smtClean="0"/>
-              <a:t>11/04/2024</a:t>
+              <a:t>20/08/2024</a:t>
             </a:fld>
             <a:endParaRPr lang="fr-FR"/>
           </a:p>
@@ -2610,7 +2618,7 @@
           <a:p>
             <a:fld id="{1629B0A5-A2FC-4930-8605-694DD097931F}" type="datetimeFigureOut">
               <a:rPr lang="fr-FR" smtClean="0"/>
-              <a:t>11/04/2024</a:t>
+              <a:t>20/08/2024</a:t>
             </a:fld>
             <a:endParaRPr lang="fr-FR"/>
           </a:p>
@@ -2921,7 +2929,7 @@
           <a:p>
             <a:fld id="{1629B0A5-A2FC-4930-8605-694DD097931F}" type="datetimeFigureOut">
               <a:rPr lang="fr-FR" smtClean="0"/>
-              <a:t>11/04/2024</a:t>
+              <a:t>20/08/2024</a:t>
             </a:fld>
             <a:endParaRPr lang="fr-FR"/>
           </a:p>
@@ -3212,7 +3220,7 @@
           <a:p>
             <a:fld id="{1629B0A5-A2FC-4930-8605-694DD097931F}" type="datetimeFigureOut">
               <a:rPr lang="fr-FR" smtClean="0"/>
-              <a:t>11/04/2024</a:t>
+              <a:t>20/08/2024</a:t>
             </a:fld>
             <a:endParaRPr lang="fr-FR"/>
           </a:p>
@@ -3453,7 +3461,7 @@
           <a:p>
             <a:fld id="{1629B0A5-A2FC-4930-8605-694DD097931F}" type="datetimeFigureOut">
               <a:rPr lang="fr-FR" smtClean="0"/>
-              <a:t>11/04/2024</a:t>
+              <a:t>20/08/2024</a:t>
             </a:fld>
             <a:endParaRPr lang="fr-FR"/>
           </a:p>
@@ -4910,7 +4918,7 @@
 </file>
 
 <file path=ppt/slides/slide2.xml><?xml version="1.0" encoding="utf-8"?>
-<p:sld xmlns:a="http://schemas.openxmlformats.org/drawingml/2006/main" xmlns:r="http://schemas.openxmlformats.org/officeDocument/2006/relationships" xmlns:p="http://schemas.openxmlformats.org/presentationml/2006/main">
+<p:sld xmlns:a="http://schemas.openxmlformats.org/drawingml/2006/main" xmlns:r="http://schemas.openxmlformats.org/officeDocument/2006/relationships" xmlns:p="http://schemas.openxmlformats.org/presentationml/2006/main" show="0">
   <p:cSld>
     <p:spTree>
       <p:nvGrpSpPr>

</xml_diff>